<commit_message>
update báo cáo word và powerpoint
</commit_message>
<xml_diff>
--- a/ppt - báo cáo đồ án tốt nghiệp.pptx
+++ b/ppt - báo cáo đồ án tốt nghiệp.pptx
@@ -5,7 +5,7 @@
     <p:sldMasterId id="2147483648" r:id="rId1"/>
   </p:sldMasterIdLst>
   <p:notesMasterIdLst>
-    <p:notesMasterId r:id="rId22"/>
+    <p:notesMasterId r:id="rId21"/>
   </p:notesMasterIdLst>
   <p:sldIdLst>
     <p:sldId id="256" r:id="rId2"/>
@@ -18,44 +18,43 @@
     <p:sldId id="262" r:id="rId9"/>
     <p:sldId id="290" r:id="rId10"/>
     <p:sldId id="291" r:id="rId11"/>
-    <p:sldId id="283" r:id="rId12"/>
-    <p:sldId id="265" r:id="rId13"/>
-    <p:sldId id="284" r:id="rId14"/>
-    <p:sldId id="285" r:id="rId15"/>
-    <p:sldId id="287" r:id="rId16"/>
-    <p:sldId id="288" r:id="rId17"/>
-    <p:sldId id="289" r:id="rId18"/>
-    <p:sldId id="281" r:id="rId19"/>
-    <p:sldId id="264" r:id="rId20"/>
-    <p:sldId id="278" r:id="rId21"/>
+    <p:sldId id="265" r:id="rId12"/>
+    <p:sldId id="284" r:id="rId13"/>
+    <p:sldId id="285" r:id="rId14"/>
+    <p:sldId id="287" r:id="rId15"/>
+    <p:sldId id="288" r:id="rId16"/>
+    <p:sldId id="289" r:id="rId17"/>
+    <p:sldId id="281" r:id="rId18"/>
+    <p:sldId id="264" r:id="rId19"/>
+    <p:sldId id="278" r:id="rId20"/>
   </p:sldIdLst>
   <p:sldSz cx="18288000" cy="10287000"/>
   <p:notesSz cx="6858000" cy="9144000"/>
   <p:embeddedFontLst>
     <p:embeddedFont>
       <p:font typeface="Calibri" panose="020F0502020204030204" pitchFamily="34" charset="0"/>
-      <p:regular r:id="rId23"/>
-      <p:bold r:id="rId24"/>
-      <p:italic r:id="rId25"/>
-      <p:boldItalic r:id="rId26"/>
+      <p:regular r:id="rId22"/>
+      <p:bold r:id="rId23"/>
+      <p:italic r:id="rId24"/>
+      <p:boldItalic r:id="rId25"/>
     </p:embeddedFont>
     <p:embeddedFont>
       <p:font typeface="Fira Sans Bold" panose="020B0604020202020204" charset="0"/>
-      <p:regular r:id="rId27"/>
+      <p:regular r:id="rId26"/>
     </p:embeddedFont>
     <p:embeddedFont>
       <p:font typeface="Fira Sans Light" panose="020B0403050000020004" pitchFamily="34" charset="0"/>
-      <p:regular r:id="rId28"/>
-      <p:italic r:id="rId29"/>
+      <p:regular r:id="rId27"/>
+      <p:italic r:id="rId28"/>
     </p:embeddedFont>
     <p:embeddedFont>
       <p:font typeface="Fira Sans Medium" panose="020B0603050000020004" pitchFamily="34" charset="0"/>
-      <p:regular r:id="rId30"/>
-      <p:italic r:id="rId31"/>
+      <p:regular r:id="rId29"/>
+      <p:italic r:id="rId30"/>
     </p:embeddedFont>
     <p:embeddedFont>
       <p:font typeface="Fira Sans Medium Bold" panose="020B0604020202020204" charset="0"/>
-      <p:regular r:id="rId32"/>
+      <p:regular r:id="rId31"/>
     </p:embeddedFont>
   </p:embeddedFontLst>
   <p:defaultTextStyle>
@@ -754,7 +753,7 @@
           <a:p>
             <a:fld id="{F5150C7E-BB03-4C07-A585-7F10D09D7497}" type="slidenum">
               <a:rPr lang="en-US" smtClean="0"/>
-              <a:t>18</a:t>
+              <a:t>17</a:t>
             </a:fld>
             <a:endParaRPr lang="en-US"/>
           </a:p>
@@ -7159,630 +7158,6 @@
           <a:chExt cx="0" cy="0"/>
         </a:xfrm>
       </p:grpSpPr>
-      <p:pic>
-        <p:nvPicPr>
-          <p:cNvPr id="4" name="Picture 3">
-            <a:extLst>
-              <a:ext uri="{FF2B5EF4-FFF2-40B4-BE49-F238E27FC236}">
-                <a16:creationId xmlns:a16="http://schemas.microsoft.com/office/drawing/2014/main" id="{FD3A6B10-42DE-4EA8-BB3F-AF21523CAD77}"/>
-              </a:ext>
-            </a:extLst>
-          </p:cNvPr>
-          <p:cNvPicPr/>
-          <p:nvPr/>
-        </p:nvPicPr>
-        <p:blipFill>
-          <a:blip r:embed="rId2">
-            <a:extLst>
-              <a:ext uri="{28A0092B-C50C-407E-A947-70E740481C1C}">
-                <a14:useLocalDpi xmlns:a14="http://schemas.microsoft.com/office/drawing/2010/main" val="0"/>
-              </a:ext>
-            </a:extLst>
-          </a:blip>
-          <a:stretch>
-            <a:fillRect/>
-          </a:stretch>
-        </p:blipFill>
-        <p:spPr>
-          <a:xfrm>
-            <a:off x="304800" y="294438"/>
-            <a:ext cx="5218663" cy="9268662"/>
-          </a:xfrm>
-          <a:prstGeom prst="rect">
-            <a:avLst/>
-          </a:prstGeom>
-        </p:spPr>
-      </p:pic>
-      <p:pic>
-        <p:nvPicPr>
-          <p:cNvPr id="5" name="Picture 4">
-            <a:extLst>
-              <a:ext uri="{FF2B5EF4-FFF2-40B4-BE49-F238E27FC236}">
-                <a16:creationId xmlns:a16="http://schemas.microsoft.com/office/drawing/2014/main" id="{6DA9AE2D-9CD2-49A7-85A4-3B3FB99EEC28}"/>
-              </a:ext>
-            </a:extLst>
-          </p:cNvPr>
-          <p:cNvPicPr/>
-          <p:nvPr/>
-        </p:nvPicPr>
-        <p:blipFill>
-          <a:blip r:embed="rId3">
-            <a:extLst>
-              <a:ext uri="{28A0092B-C50C-407E-A947-70E740481C1C}">
-                <a14:useLocalDpi xmlns:a14="http://schemas.microsoft.com/office/drawing/2010/main" val="0"/>
-              </a:ext>
-            </a:extLst>
-          </a:blip>
-          <a:stretch>
-            <a:fillRect/>
-          </a:stretch>
-        </p:blipFill>
-        <p:spPr>
-          <a:xfrm>
-            <a:off x="6263957" y="294438"/>
-            <a:ext cx="6156643" cy="9268662"/>
-          </a:xfrm>
-          <a:prstGeom prst="rect">
-            <a:avLst/>
-          </a:prstGeom>
-        </p:spPr>
-      </p:pic>
-      <p:pic>
-        <p:nvPicPr>
-          <p:cNvPr id="6" name="Picture 5">
-            <a:extLst>
-              <a:ext uri="{FF2B5EF4-FFF2-40B4-BE49-F238E27FC236}">
-                <a16:creationId xmlns:a16="http://schemas.microsoft.com/office/drawing/2014/main" id="{FBE1F95B-EFF7-438F-9384-6A7D8077CF5A}"/>
-              </a:ext>
-            </a:extLst>
-          </p:cNvPr>
-          <p:cNvPicPr/>
-          <p:nvPr/>
-        </p:nvPicPr>
-        <p:blipFill>
-          <a:blip r:embed="rId4">
-            <a:extLst>
-              <a:ext uri="{28A0092B-C50C-407E-A947-70E740481C1C}">
-                <a14:useLocalDpi xmlns:a14="http://schemas.microsoft.com/office/drawing/2010/main" val="0"/>
-              </a:ext>
-            </a:extLst>
-          </a:blip>
-          <a:stretch>
-            <a:fillRect/>
-          </a:stretch>
-        </p:blipFill>
-        <p:spPr>
-          <a:xfrm>
-            <a:off x="13161094" y="4713086"/>
-            <a:ext cx="4498023" cy="860828"/>
-          </a:xfrm>
-          <a:prstGeom prst="rect">
-            <a:avLst/>
-          </a:prstGeom>
-        </p:spPr>
-      </p:pic>
-      <p:sp>
-        <p:nvSpPr>
-          <p:cNvPr id="7" name="TextBox 3">
-            <a:extLst>
-              <a:ext uri="{FF2B5EF4-FFF2-40B4-BE49-F238E27FC236}">
-                <a16:creationId xmlns:a16="http://schemas.microsoft.com/office/drawing/2014/main" id="{C187FE89-D2B6-4E2E-BFC7-F0160EA1B4B2}"/>
-              </a:ext>
-            </a:extLst>
-          </p:cNvPr>
-          <p:cNvSpPr txBox="1"/>
-          <p:nvPr/>
-        </p:nvSpPr>
-        <p:spPr>
-          <a:xfrm>
-            <a:off x="304799" y="9791701"/>
-            <a:ext cx="5218663" cy="307777"/>
-          </a:xfrm>
-          <a:prstGeom prst="rect">
-            <a:avLst/>
-          </a:prstGeom>
-        </p:spPr>
-        <p:txBody>
-          <a:bodyPr wrap="square" lIns="0" tIns="0" rIns="0" bIns="0" rtlCol="0" anchor="t">
-            <a:spAutoFit/>
-          </a:bodyPr>
-          <a:lstStyle/>
-          <a:p>
-            <a:pPr marL="0" lvl="0" indent="0" algn="ctr">
-              <a:spcBef>
-                <a:spcPct val="0"/>
-              </a:spcBef>
-            </a:pPr>
-            <a:r>
-              <a:rPr lang="en-US" sz="2000" dirty="0" err="1">
-                <a:solidFill>
-                  <a:srgbClr val="1836B2"/>
-                </a:solidFill>
-                <a:latin typeface="Fira Sans Medium Bold"/>
-              </a:rPr>
-              <a:t>Mô</a:t>
-            </a:r>
-            <a:r>
-              <a:rPr lang="en-US" sz="2000" dirty="0">
-                <a:solidFill>
-                  <a:srgbClr val="1836B2"/>
-                </a:solidFill>
-                <a:latin typeface="Fira Sans Medium Bold"/>
-              </a:rPr>
-              <a:t> </a:t>
-            </a:r>
-            <a:r>
-              <a:rPr lang="en-US" sz="2000" dirty="0" err="1">
-                <a:solidFill>
-                  <a:srgbClr val="1836B2"/>
-                </a:solidFill>
-                <a:latin typeface="Fira Sans Medium Bold"/>
-              </a:rPr>
-              <a:t>hình</a:t>
-            </a:r>
-            <a:r>
-              <a:rPr lang="en-US" sz="2000" dirty="0">
-                <a:solidFill>
-                  <a:srgbClr val="1836B2"/>
-                </a:solidFill>
-                <a:latin typeface="Fira Sans Medium Bold"/>
-              </a:rPr>
-              <a:t> </a:t>
-            </a:r>
-            <a:r>
-              <a:rPr lang="en-US" sz="2000" dirty="0" err="1">
-                <a:solidFill>
-                  <a:srgbClr val="1836B2"/>
-                </a:solidFill>
-                <a:latin typeface="Fira Sans Medium Bold"/>
-              </a:rPr>
-              <a:t>chức</a:t>
-            </a:r>
-            <a:r>
-              <a:rPr lang="en-US" sz="2000" dirty="0">
-                <a:solidFill>
-                  <a:srgbClr val="1836B2"/>
-                </a:solidFill>
-                <a:latin typeface="Fira Sans Medium Bold"/>
-              </a:rPr>
-              <a:t> </a:t>
-            </a:r>
-            <a:r>
-              <a:rPr lang="en-US" sz="2000" dirty="0" err="1">
-                <a:solidFill>
-                  <a:srgbClr val="1836B2"/>
-                </a:solidFill>
-                <a:latin typeface="Fira Sans Medium Bold"/>
-              </a:rPr>
-              <a:t>năng</a:t>
-            </a:r>
-            <a:r>
-              <a:rPr lang="en-US" sz="2000" dirty="0">
-                <a:solidFill>
-                  <a:srgbClr val="1836B2"/>
-                </a:solidFill>
-                <a:latin typeface="Fira Sans Medium Bold"/>
-              </a:rPr>
-              <a:t> </a:t>
-            </a:r>
-            <a:r>
-              <a:rPr lang="en-US" sz="2000" dirty="0" err="1">
-                <a:solidFill>
-                  <a:srgbClr val="1836B2"/>
-                </a:solidFill>
-                <a:latin typeface="Fira Sans Medium Bold"/>
-              </a:rPr>
-              <a:t>quản</a:t>
-            </a:r>
-            <a:r>
-              <a:rPr lang="en-US" sz="2000" dirty="0">
-                <a:solidFill>
-                  <a:srgbClr val="1836B2"/>
-                </a:solidFill>
-                <a:latin typeface="Fira Sans Medium Bold"/>
-              </a:rPr>
-              <a:t> </a:t>
-            </a:r>
-            <a:r>
-              <a:rPr lang="en-US" sz="2000" dirty="0" err="1">
-                <a:solidFill>
-                  <a:srgbClr val="1836B2"/>
-                </a:solidFill>
-                <a:latin typeface="Fira Sans Medium Bold"/>
-              </a:rPr>
-              <a:t>lý</a:t>
-            </a:r>
-            <a:r>
-              <a:rPr lang="en-US" sz="2000" dirty="0">
-                <a:solidFill>
-                  <a:srgbClr val="1836B2"/>
-                </a:solidFill>
-                <a:latin typeface="Fira Sans Medium Bold"/>
-              </a:rPr>
-              <a:t> </a:t>
-            </a:r>
-            <a:r>
-              <a:rPr lang="en-US" sz="2000" dirty="0" err="1">
-                <a:solidFill>
-                  <a:srgbClr val="1836B2"/>
-                </a:solidFill>
-                <a:latin typeface="Fira Sans Medium Bold"/>
-              </a:rPr>
-              <a:t>hệ</a:t>
-            </a:r>
-            <a:r>
-              <a:rPr lang="en-US" sz="2000" dirty="0">
-                <a:solidFill>
-                  <a:srgbClr val="1836B2"/>
-                </a:solidFill>
-                <a:latin typeface="Fira Sans Medium Bold"/>
-              </a:rPr>
-              <a:t> </a:t>
-            </a:r>
-            <a:r>
-              <a:rPr lang="en-US" sz="2000" dirty="0" err="1">
-                <a:solidFill>
-                  <a:srgbClr val="1836B2"/>
-                </a:solidFill>
-                <a:latin typeface="Fira Sans Medium Bold"/>
-              </a:rPr>
-              <a:t>thống</a:t>
-            </a:r>
-            <a:endParaRPr lang="en-US" sz="2000" dirty="0">
-              <a:solidFill>
-                <a:srgbClr val="1836B2"/>
-              </a:solidFill>
-              <a:latin typeface="Fira Sans Medium Bold"/>
-            </a:endParaRPr>
-          </a:p>
-        </p:txBody>
-      </p:sp>
-      <p:sp>
-        <p:nvSpPr>
-          <p:cNvPr id="8" name="TextBox 3">
-            <a:extLst>
-              <a:ext uri="{FF2B5EF4-FFF2-40B4-BE49-F238E27FC236}">
-                <a16:creationId xmlns:a16="http://schemas.microsoft.com/office/drawing/2014/main" id="{A59D3303-8A70-4ABD-A499-D23F915A3ABB}"/>
-              </a:ext>
-            </a:extLst>
-          </p:cNvPr>
-          <p:cNvSpPr txBox="1"/>
-          <p:nvPr/>
-        </p:nvSpPr>
-        <p:spPr>
-          <a:xfrm>
-            <a:off x="6732946" y="9791699"/>
-            <a:ext cx="5218663" cy="307777"/>
-          </a:xfrm>
-          <a:prstGeom prst="rect">
-            <a:avLst/>
-          </a:prstGeom>
-        </p:spPr>
-        <p:txBody>
-          <a:bodyPr wrap="square" lIns="0" tIns="0" rIns="0" bIns="0" rtlCol="0" anchor="t">
-            <a:spAutoFit/>
-          </a:bodyPr>
-          <a:lstStyle/>
-          <a:p>
-            <a:pPr marL="0" lvl="0" indent="0" algn="ctr">
-              <a:spcBef>
-                <a:spcPct val="0"/>
-              </a:spcBef>
-            </a:pPr>
-            <a:r>
-              <a:rPr lang="en-US" sz="2000" dirty="0" err="1">
-                <a:solidFill>
-                  <a:srgbClr val="1836B2"/>
-                </a:solidFill>
-                <a:latin typeface="Fira Sans Medium Bold"/>
-              </a:rPr>
-              <a:t>Mô</a:t>
-            </a:r>
-            <a:r>
-              <a:rPr lang="en-US" sz="2000" dirty="0">
-                <a:solidFill>
-                  <a:srgbClr val="1836B2"/>
-                </a:solidFill>
-                <a:latin typeface="Fira Sans Medium Bold"/>
-              </a:rPr>
-              <a:t> </a:t>
-            </a:r>
-            <a:r>
-              <a:rPr lang="en-US" sz="2000" dirty="0" err="1">
-                <a:solidFill>
-                  <a:srgbClr val="1836B2"/>
-                </a:solidFill>
-                <a:latin typeface="Fira Sans Medium Bold"/>
-              </a:rPr>
-              <a:t>hình</a:t>
-            </a:r>
-            <a:r>
-              <a:rPr lang="en-US" sz="2000" dirty="0">
-                <a:solidFill>
-                  <a:srgbClr val="1836B2"/>
-                </a:solidFill>
-                <a:latin typeface="Fira Sans Medium Bold"/>
-              </a:rPr>
-              <a:t> </a:t>
-            </a:r>
-            <a:r>
-              <a:rPr lang="en-US" sz="2000" dirty="0" err="1">
-                <a:solidFill>
-                  <a:srgbClr val="1836B2"/>
-                </a:solidFill>
-                <a:latin typeface="Fira Sans Medium Bold"/>
-              </a:rPr>
-              <a:t>chức</a:t>
-            </a:r>
-            <a:r>
-              <a:rPr lang="en-US" sz="2000" dirty="0">
-                <a:solidFill>
-                  <a:srgbClr val="1836B2"/>
-                </a:solidFill>
-                <a:latin typeface="Fira Sans Medium Bold"/>
-              </a:rPr>
-              <a:t> </a:t>
-            </a:r>
-            <a:r>
-              <a:rPr lang="en-US" sz="2000" dirty="0" err="1">
-                <a:solidFill>
-                  <a:srgbClr val="1836B2"/>
-                </a:solidFill>
-                <a:latin typeface="Fira Sans Medium Bold"/>
-              </a:rPr>
-              <a:t>năng</a:t>
-            </a:r>
-            <a:r>
-              <a:rPr lang="en-US" sz="2000" dirty="0">
-                <a:solidFill>
-                  <a:srgbClr val="1836B2"/>
-                </a:solidFill>
-                <a:latin typeface="Fira Sans Medium Bold"/>
-              </a:rPr>
-              <a:t> </a:t>
-            </a:r>
-            <a:r>
-              <a:rPr lang="en-US" sz="2000" dirty="0" err="1">
-                <a:solidFill>
-                  <a:srgbClr val="1836B2"/>
-                </a:solidFill>
-                <a:latin typeface="Fira Sans Medium Bold"/>
-              </a:rPr>
-              <a:t>quản</a:t>
-            </a:r>
-            <a:r>
-              <a:rPr lang="en-US" sz="2000" dirty="0">
-                <a:solidFill>
-                  <a:srgbClr val="1836B2"/>
-                </a:solidFill>
-                <a:latin typeface="Fira Sans Medium Bold"/>
-              </a:rPr>
-              <a:t> </a:t>
-            </a:r>
-            <a:r>
-              <a:rPr lang="en-US" sz="2000" dirty="0" err="1">
-                <a:solidFill>
-                  <a:srgbClr val="1836B2"/>
-                </a:solidFill>
-                <a:latin typeface="Fira Sans Medium Bold"/>
-              </a:rPr>
-              <a:t>lý</a:t>
-            </a:r>
-            <a:r>
-              <a:rPr lang="en-US" sz="2000" dirty="0">
-                <a:solidFill>
-                  <a:srgbClr val="1836B2"/>
-                </a:solidFill>
-                <a:latin typeface="Fira Sans Medium Bold"/>
-              </a:rPr>
-              <a:t> </a:t>
-            </a:r>
-            <a:r>
-              <a:rPr lang="en-US" sz="2000" dirty="0" err="1">
-                <a:solidFill>
-                  <a:srgbClr val="1836B2"/>
-                </a:solidFill>
-                <a:latin typeface="Fira Sans Medium Bold"/>
-              </a:rPr>
-              <a:t>danh</a:t>
-            </a:r>
-            <a:r>
-              <a:rPr lang="en-US" sz="2000" dirty="0">
-                <a:solidFill>
-                  <a:srgbClr val="1836B2"/>
-                </a:solidFill>
-                <a:latin typeface="Fira Sans Medium Bold"/>
-              </a:rPr>
-              <a:t> </a:t>
-            </a:r>
-            <a:r>
-              <a:rPr lang="en-US" sz="2000" dirty="0" err="1">
-                <a:solidFill>
-                  <a:srgbClr val="1836B2"/>
-                </a:solidFill>
-                <a:latin typeface="Fira Sans Medium Bold"/>
-              </a:rPr>
-              <a:t>mục</a:t>
-            </a:r>
-            <a:endParaRPr lang="en-US" sz="2000" dirty="0">
-              <a:solidFill>
-                <a:srgbClr val="1836B2"/>
-              </a:solidFill>
-              <a:latin typeface="Fira Sans Medium Bold"/>
-            </a:endParaRPr>
-          </a:p>
-        </p:txBody>
-      </p:sp>
-      <p:sp>
-        <p:nvSpPr>
-          <p:cNvPr id="9" name="TextBox 3">
-            <a:extLst>
-              <a:ext uri="{FF2B5EF4-FFF2-40B4-BE49-F238E27FC236}">
-                <a16:creationId xmlns:a16="http://schemas.microsoft.com/office/drawing/2014/main" id="{087217D6-68A4-4272-8A7B-EC08DC970E05}"/>
-              </a:ext>
-            </a:extLst>
-          </p:cNvPr>
-          <p:cNvSpPr txBox="1"/>
-          <p:nvPr/>
-        </p:nvSpPr>
-        <p:spPr>
-          <a:xfrm>
-            <a:off x="12800773" y="9791699"/>
-            <a:ext cx="5218663" cy="307777"/>
-          </a:xfrm>
-          <a:prstGeom prst="rect">
-            <a:avLst/>
-          </a:prstGeom>
-        </p:spPr>
-        <p:txBody>
-          <a:bodyPr wrap="square" lIns="0" tIns="0" rIns="0" bIns="0" rtlCol="0" anchor="t">
-            <a:spAutoFit/>
-          </a:bodyPr>
-          <a:lstStyle/>
-          <a:p>
-            <a:pPr marL="0" lvl="0" indent="0" algn="ctr">
-              <a:spcBef>
-                <a:spcPct val="0"/>
-              </a:spcBef>
-            </a:pPr>
-            <a:r>
-              <a:rPr lang="en-US" sz="2000" dirty="0" err="1">
-                <a:solidFill>
-                  <a:srgbClr val="1836B2"/>
-                </a:solidFill>
-                <a:latin typeface="Fira Sans Medium Bold"/>
-              </a:rPr>
-              <a:t>Mô</a:t>
-            </a:r>
-            <a:r>
-              <a:rPr lang="en-US" sz="2000" dirty="0">
-                <a:solidFill>
-                  <a:srgbClr val="1836B2"/>
-                </a:solidFill>
-                <a:latin typeface="Fira Sans Medium Bold"/>
-              </a:rPr>
-              <a:t> </a:t>
-            </a:r>
-            <a:r>
-              <a:rPr lang="en-US" sz="2000" dirty="0" err="1">
-                <a:solidFill>
-                  <a:srgbClr val="1836B2"/>
-                </a:solidFill>
-                <a:latin typeface="Fira Sans Medium Bold"/>
-              </a:rPr>
-              <a:t>hình</a:t>
-            </a:r>
-            <a:r>
-              <a:rPr lang="en-US" sz="2000" dirty="0">
-                <a:solidFill>
-                  <a:srgbClr val="1836B2"/>
-                </a:solidFill>
-                <a:latin typeface="Fira Sans Medium Bold"/>
-              </a:rPr>
-              <a:t> </a:t>
-            </a:r>
-            <a:r>
-              <a:rPr lang="en-US" sz="2000" dirty="0" err="1">
-                <a:solidFill>
-                  <a:srgbClr val="1836B2"/>
-                </a:solidFill>
-                <a:latin typeface="Fira Sans Medium Bold"/>
-              </a:rPr>
-              <a:t>chức</a:t>
-            </a:r>
-            <a:r>
-              <a:rPr lang="en-US" sz="2000" dirty="0">
-                <a:solidFill>
-                  <a:srgbClr val="1836B2"/>
-                </a:solidFill>
-                <a:latin typeface="Fira Sans Medium Bold"/>
-              </a:rPr>
-              <a:t> </a:t>
-            </a:r>
-            <a:r>
-              <a:rPr lang="en-US" sz="2000" dirty="0" err="1">
-                <a:solidFill>
-                  <a:srgbClr val="1836B2"/>
-                </a:solidFill>
-                <a:latin typeface="Fira Sans Medium Bold"/>
-              </a:rPr>
-              <a:t>năng</a:t>
-            </a:r>
-            <a:r>
-              <a:rPr lang="en-US" sz="2000" dirty="0">
-                <a:solidFill>
-                  <a:srgbClr val="1836B2"/>
-                </a:solidFill>
-                <a:latin typeface="Fira Sans Medium Bold"/>
-              </a:rPr>
-              <a:t> </a:t>
-            </a:r>
-            <a:r>
-              <a:rPr lang="en-US" sz="2000" dirty="0" err="1">
-                <a:solidFill>
-                  <a:srgbClr val="1836B2"/>
-                </a:solidFill>
-                <a:latin typeface="Fira Sans Medium Bold"/>
-              </a:rPr>
-              <a:t>thống</a:t>
-            </a:r>
-            <a:r>
-              <a:rPr lang="en-US" sz="2000" dirty="0">
-                <a:solidFill>
-                  <a:srgbClr val="1836B2"/>
-                </a:solidFill>
-                <a:latin typeface="Fira Sans Medium Bold"/>
-              </a:rPr>
-              <a:t> </a:t>
-            </a:r>
-            <a:r>
-              <a:rPr lang="en-US" sz="2000" dirty="0" err="1">
-                <a:solidFill>
-                  <a:srgbClr val="1836B2"/>
-                </a:solidFill>
-                <a:latin typeface="Fira Sans Medium Bold"/>
-              </a:rPr>
-              <a:t>kê</a:t>
-            </a:r>
-            <a:endParaRPr lang="en-US" sz="2000" dirty="0">
-              <a:solidFill>
-                <a:srgbClr val="1836B2"/>
-              </a:solidFill>
-              <a:latin typeface="Fira Sans Medium Bold"/>
-            </a:endParaRPr>
-          </a:p>
-        </p:txBody>
-      </p:sp>
-    </p:spTree>
-    <p:extLst>
-      <p:ext uri="{BB962C8B-B14F-4D97-AF65-F5344CB8AC3E}">
-        <p14:creationId xmlns:p14="http://schemas.microsoft.com/office/powerpoint/2010/main" val="3597570292"/>
-      </p:ext>
-    </p:extLst>
-  </p:cSld>
-  <p:clrMapOvr>
-    <a:masterClrMapping/>
-  </p:clrMapOvr>
-</p:sld>
-</file>
-
-<file path=ppt/slides/slide12.xml><?xml version="1.0" encoding="utf-8"?>
-<p:sld xmlns:a="http://schemas.openxmlformats.org/drawingml/2006/main" xmlns:r="http://schemas.openxmlformats.org/officeDocument/2006/relationships" xmlns:p="http://schemas.openxmlformats.org/presentationml/2006/main">
-  <p:cSld>
-    <p:spTree>
-      <p:nvGrpSpPr>
-        <p:cNvPr id="1" name=""/>
-        <p:cNvGrpSpPr/>
-        <p:nvPr/>
-      </p:nvGrpSpPr>
-      <p:grpSpPr>
-        <a:xfrm>
-          <a:off x="0" y="0"/>
-          <a:ext cx="0" cy="0"/>
-          <a:chOff x="0" y="0"/>
-          <a:chExt cx="0" cy="0"/>
-        </a:xfrm>
-      </p:grpSpPr>
       <p:sp>
         <p:nvSpPr>
           <p:cNvPr id="55" name="TextBox 55"/>
@@ -7865,7 +7240,7 @@
 </p:sld>
 </file>
 
-<file path=ppt/slides/slide13.xml><?xml version="1.0" encoding="utf-8"?>
+<file path=ppt/slides/slide12.xml><?xml version="1.0" encoding="utf-8"?>
 <p:sld xmlns:a="http://schemas.openxmlformats.org/drawingml/2006/main" xmlns:r="http://schemas.openxmlformats.org/officeDocument/2006/relationships" xmlns:p="http://schemas.openxmlformats.org/presentationml/2006/main">
   <p:cSld>
     <p:spTree>
@@ -7967,7 +7342,7 @@
 </p:sld>
 </file>
 
-<file path=ppt/slides/slide14.xml><?xml version="1.0" encoding="utf-8"?>
+<file path=ppt/slides/slide13.xml><?xml version="1.0" encoding="utf-8"?>
 <p:sld xmlns:a="http://schemas.openxmlformats.org/drawingml/2006/main" xmlns:r="http://schemas.openxmlformats.org/officeDocument/2006/relationships" xmlns:p="http://schemas.openxmlformats.org/presentationml/2006/main">
   <p:cSld>
     <p:spTree>
@@ -8069,7 +7444,7 @@
 </p:sld>
 </file>
 
-<file path=ppt/slides/slide15.xml><?xml version="1.0" encoding="utf-8"?>
+<file path=ppt/slides/slide14.xml><?xml version="1.0" encoding="utf-8"?>
 <p:sld xmlns:a="http://schemas.openxmlformats.org/drawingml/2006/main" xmlns:r="http://schemas.openxmlformats.org/officeDocument/2006/relationships" xmlns:p="http://schemas.openxmlformats.org/presentationml/2006/main">
   <p:cSld>
     <p:spTree>
@@ -8177,7 +7552,7 @@
 </p:sld>
 </file>
 
-<file path=ppt/slides/slide16.xml><?xml version="1.0" encoding="utf-8"?>
+<file path=ppt/slides/slide15.xml><?xml version="1.0" encoding="utf-8"?>
 <p:sld xmlns:a="http://schemas.openxmlformats.org/drawingml/2006/main" xmlns:r="http://schemas.openxmlformats.org/officeDocument/2006/relationships" xmlns:p="http://schemas.openxmlformats.org/presentationml/2006/main">
   <p:cSld>
     <p:spTree>
@@ -8281,7 +7656,7 @@
 </p:sld>
 </file>
 
-<file path=ppt/slides/slide17.xml><?xml version="1.0" encoding="utf-8"?>
+<file path=ppt/slides/slide16.xml><?xml version="1.0" encoding="utf-8"?>
 <p:sld xmlns:a="http://schemas.openxmlformats.org/drawingml/2006/main" xmlns:r="http://schemas.openxmlformats.org/officeDocument/2006/relationships" xmlns:p="http://schemas.openxmlformats.org/presentationml/2006/main">
   <p:cSld>
     <p:spTree>
@@ -8385,7 +7760,7 @@
 </p:sld>
 </file>
 
-<file path=ppt/slides/slide18.xml><?xml version="1.0" encoding="utf-8"?>
+<file path=ppt/slides/slide17.xml><?xml version="1.0" encoding="utf-8"?>
 <p:sld xmlns:a="http://schemas.openxmlformats.org/drawingml/2006/main" xmlns:r="http://schemas.openxmlformats.org/officeDocument/2006/relationships" xmlns:p="http://schemas.openxmlformats.org/presentationml/2006/main">
   <p:cSld>
     <p:spTree>
@@ -10167,7 +9542,7 @@
 </p:sld>
 </file>
 
-<file path=ppt/slides/slide19.xml><?xml version="1.0" encoding="utf-8"?>
+<file path=ppt/slides/slide18.xml><?xml version="1.0" encoding="utf-8"?>
 <p:sld xmlns:a="http://schemas.openxmlformats.org/drawingml/2006/main" xmlns:r="http://schemas.openxmlformats.org/officeDocument/2006/relationships" xmlns:p="http://schemas.openxmlformats.org/presentationml/2006/main">
   <p:cSld>
     <p:spTree>
@@ -10443,274 +9818,7 @@
 </p:sld>
 </file>
 
-<file path=ppt/slides/slide2.xml><?xml version="1.0" encoding="utf-8"?>
-<p:sld xmlns:a="http://schemas.openxmlformats.org/drawingml/2006/main" xmlns:r="http://schemas.openxmlformats.org/officeDocument/2006/relationships" xmlns:p="http://schemas.openxmlformats.org/presentationml/2006/main">
-  <p:cSld>
-    <p:spTree>
-      <p:nvGrpSpPr>
-        <p:cNvPr id="1" name=""/>
-        <p:cNvGrpSpPr/>
-        <p:nvPr/>
-      </p:nvGrpSpPr>
-      <p:grpSpPr>
-        <a:xfrm>
-          <a:off x="0" y="0"/>
-          <a:ext cx="0" cy="0"/>
-          <a:chOff x="0" y="0"/>
-          <a:chExt cx="0" cy="0"/>
-        </a:xfrm>
-      </p:grpSpPr>
-      <p:pic>
-        <p:nvPicPr>
-          <p:cNvPr id="2" name="Picture 2"/>
-          <p:cNvPicPr>
-            <a:picLocks noChangeAspect="1"/>
-          </p:cNvPicPr>
-          <p:nvPr/>
-        </p:nvPicPr>
-        <p:blipFill>
-          <a:blip r:embed="rId2">
-            <a:extLst>
-              <a:ext uri="{28A0092B-C50C-407E-A947-70E740481C1C}">
-                <a14:useLocalDpi xmlns:a14="http://schemas.microsoft.com/office/drawing/2010/main" val="0"/>
-              </a:ext>
-              <a:ext uri="{96DAC541-7B7A-43D3-8B79-37D633B846F1}">
-                <asvg:svgBlip xmlns:asvg="http://schemas.microsoft.com/office/drawing/2016/SVG/main" r:embed="rId3"/>
-              </a:ext>
-            </a:extLst>
-          </a:blip>
-          <a:srcRect t="34026"/>
-          <a:stretch>
-            <a:fillRect/>
-          </a:stretch>
-        </p:blipFill>
-        <p:spPr>
-          <a:xfrm rot="-5400000" flipV="1">
-            <a:off x="13347499" y="1607857"/>
-            <a:ext cx="12384751" cy="7071286"/>
-          </a:xfrm>
-          <a:prstGeom prst="rect">
-            <a:avLst/>
-          </a:prstGeom>
-        </p:spPr>
-      </p:pic>
-      <p:sp>
-        <p:nvSpPr>
-          <p:cNvPr id="3" name="TextBox 3"/>
-          <p:cNvSpPr txBox="1"/>
-          <p:nvPr/>
-        </p:nvSpPr>
-        <p:spPr>
-          <a:xfrm>
-            <a:off x="1028700" y="1257300"/>
-            <a:ext cx="7841022" cy="923330"/>
-          </a:xfrm>
-          <a:prstGeom prst="rect">
-            <a:avLst/>
-          </a:prstGeom>
-        </p:spPr>
-        <p:txBody>
-          <a:bodyPr lIns="0" tIns="0" rIns="0" bIns="0" rtlCol="0" anchor="t">
-            <a:spAutoFit/>
-          </a:bodyPr>
-          <a:lstStyle/>
-          <a:p>
-            <a:r>
-              <a:rPr lang="en-US" sz="6000" dirty="0">
-                <a:solidFill>
-                  <a:srgbClr val="1836B2"/>
-                </a:solidFill>
-                <a:latin typeface="Fira Sans Medium Bold"/>
-              </a:rPr>
-              <a:t>DANH MỤC CHƯƠNG</a:t>
-            </a:r>
-          </a:p>
-        </p:txBody>
-      </p:sp>
-      <p:sp>
-        <p:nvSpPr>
-          <p:cNvPr id="4" name="TextBox 4"/>
-          <p:cNvSpPr txBox="1"/>
-          <p:nvPr/>
-        </p:nvSpPr>
-        <p:spPr>
-          <a:xfrm>
-            <a:off x="2438400" y="2705100"/>
-            <a:ext cx="11734800" cy="3693319"/>
-          </a:xfrm>
-          <a:prstGeom prst="rect">
-            <a:avLst/>
-          </a:prstGeom>
-        </p:spPr>
-        <p:txBody>
-          <a:bodyPr wrap="square" lIns="0" tIns="0" rIns="0" bIns="0" rtlCol="0" anchor="t">
-            <a:spAutoFit/>
-          </a:bodyPr>
-          <a:lstStyle/>
-          <a:p>
-            <a:pPr marL="0" lvl="0" indent="0" algn="l"/>
-            <a:r>
-              <a:rPr lang="en-US" sz="6000" u="none" dirty="0">
-                <a:solidFill>
-                  <a:srgbClr val="000000"/>
-                </a:solidFill>
-                <a:latin typeface="Fira Sans Light"/>
-              </a:rPr>
-              <a:t>GIỚI THIỆU ĐỀ TÀI</a:t>
-            </a:r>
-          </a:p>
-          <a:p>
-            <a:pPr marL="0" lvl="0" indent="0" algn="l"/>
-            <a:r>
-              <a:rPr lang="en-US" sz="6000" u="none" dirty="0">
-                <a:solidFill>
-                  <a:srgbClr val="000000"/>
-                </a:solidFill>
-                <a:latin typeface="Fira Sans Light"/>
-              </a:rPr>
-              <a:t>CƠ SỞ LÝ THUYẾT</a:t>
-            </a:r>
-            <a:endParaRPr lang="en-US" sz="6000" dirty="0">
-              <a:solidFill>
-                <a:srgbClr val="000000"/>
-              </a:solidFill>
-              <a:latin typeface="Fira Sans Light"/>
-            </a:endParaRPr>
-          </a:p>
-          <a:p>
-            <a:pPr marL="0" lvl="0" indent="0" algn="l"/>
-            <a:r>
-              <a:rPr lang="en-US" sz="6000" u="none" dirty="0">
-                <a:solidFill>
-                  <a:srgbClr val="000000"/>
-                </a:solidFill>
-                <a:latin typeface="Fira Sans Light"/>
-              </a:rPr>
-              <a:t>PHÂN TÍCH VÀ THIẾT KẾ HỆ THỐNG</a:t>
-            </a:r>
-          </a:p>
-          <a:p>
-            <a:pPr marL="0" lvl="0" indent="0" algn="l"/>
-            <a:r>
-              <a:rPr lang="en-US" sz="6000" u="none" dirty="0">
-                <a:solidFill>
-                  <a:srgbClr val="000000"/>
-                </a:solidFill>
-                <a:latin typeface="Fira Sans Light"/>
-              </a:rPr>
-              <a:t>XÂY DỰNG ỨNG DỤNG</a:t>
-            </a:r>
-          </a:p>
-        </p:txBody>
-      </p:sp>
-      <p:sp>
-        <p:nvSpPr>
-          <p:cNvPr id="5" name="TextBox 5"/>
-          <p:cNvSpPr txBox="1"/>
-          <p:nvPr/>
-        </p:nvSpPr>
-        <p:spPr>
-          <a:xfrm>
-            <a:off x="1028700" y="2705100"/>
-            <a:ext cx="981495" cy="4616648"/>
-          </a:xfrm>
-          <a:prstGeom prst="rect">
-            <a:avLst/>
-          </a:prstGeom>
-        </p:spPr>
-        <p:txBody>
-          <a:bodyPr lIns="0" tIns="0" rIns="0" bIns="0" rtlCol="0" anchor="t">
-            <a:spAutoFit/>
-          </a:bodyPr>
-          <a:lstStyle/>
-          <a:p>
-            <a:pPr marL="0" lvl="0" indent="0" algn="l">
-              <a:spcBef>
-                <a:spcPct val="0"/>
-              </a:spcBef>
-            </a:pPr>
-            <a:r>
-              <a:rPr lang="en-US" sz="6000" u="none" dirty="0">
-                <a:solidFill>
-                  <a:srgbClr val="000000"/>
-                </a:solidFill>
-                <a:latin typeface="Fira Sans Medium"/>
-              </a:rPr>
-              <a:t>01</a:t>
-            </a:r>
-          </a:p>
-          <a:p>
-            <a:pPr marL="0" lvl="0" indent="0" algn="l">
-              <a:spcBef>
-                <a:spcPct val="0"/>
-              </a:spcBef>
-            </a:pPr>
-            <a:r>
-              <a:rPr lang="en-US" sz="6000" u="none" dirty="0">
-                <a:solidFill>
-                  <a:srgbClr val="000000"/>
-                </a:solidFill>
-                <a:latin typeface="Fira Sans Medium"/>
-              </a:rPr>
-              <a:t>02</a:t>
-            </a:r>
-          </a:p>
-          <a:p>
-            <a:pPr marL="0" lvl="0" indent="0" algn="l">
-              <a:spcBef>
-                <a:spcPct val="0"/>
-              </a:spcBef>
-            </a:pPr>
-            <a:r>
-              <a:rPr lang="en-US" sz="6000" u="none" dirty="0">
-                <a:solidFill>
-                  <a:srgbClr val="000000"/>
-                </a:solidFill>
-                <a:latin typeface="Fira Sans Medium"/>
-              </a:rPr>
-              <a:t>03</a:t>
-            </a:r>
-          </a:p>
-          <a:p>
-            <a:pPr marL="0" lvl="0" indent="0" algn="l">
-              <a:spcBef>
-                <a:spcPct val="0"/>
-              </a:spcBef>
-            </a:pPr>
-            <a:r>
-              <a:rPr lang="en-US" sz="6000" u="none" dirty="0">
-                <a:solidFill>
-                  <a:srgbClr val="000000"/>
-                </a:solidFill>
-                <a:latin typeface="Fira Sans Medium"/>
-              </a:rPr>
-              <a:t>04</a:t>
-            </a:r>
-          </a:p>
-          <a:p>
-            <a:pPr marL="0" lvl="0" indent="0" algn="l">
-              <a:spcBef>
-                <a:spcPct val="0"/>
-              </a:spcBef>
-            </a:pPr>
-            <a:endParaRPr lang="en-US" sz="6000" u="none" dirty="0">
-              <a:solidFill>
-                <a:srgbClr val="000000"/>
-              </a:solidFill>
-              <a:latin typeface="Fira Sans Medium"/>
-            </a:endParaRPr>
-          </a:p>
-        </p:txBody>
-      </p:sp>
-    </p:spTree>
-  </p:cSld>
-  <p:clrMapOvr>
-    <a:masterClrMapping/>
-  </p:clrMapOvr>
-</p:sld>
-</file>
-
-<file path=ppt/slides/slide20.xml><?xml version="1.0" encoding="utf-8"?>
+<file path=ppt/slides/slide19.xml><?xml version="1.0" encoding="utf-8"?>
 <p:sld xmlns:a="http://schemas.openxmlformats.org/drawingml/2006/main" xmlns:r="http://schemas.openxmlformats.org/officeDocument/2006/relationships" xmlns:p="http://schemas.openxmlformats.org/presentationml/2006/main">
   <p:cSld>
     <p:spTree>
@@ -10880,6 +9988,273 @@
               </a:rPr>
               <a:t>ĐÃ THEO DÕI</a:t>
             </a:r>
+          </a:p>
+        </p:txBody>
+      </p:sp>
+    </p:spTree>
+  </p:cSld>
+  <p:clrMapOvr>
+    <a:masterClrMapping/>
+  </p:clrMapOvr>
+</p:sld>
+</file>
+
+<file path=ppt/slides/slide2.xml><?xml version="1.0" encoding="utf-8"?>
+<p:sld xmlns:a="http://schemas.openxmlformats.org/drawingml/2006/main" xmlns:r="http://schemas.openxmlformats.org/officeDocument/2006/relationships" xmlns:p="http://schemas.openxmlformats.org/presentationml/2006/main">
+  <p:cSld>
+    <p:spTree>
+      <p:nvGrpSpPr>
+        <p:cNvPr id="1" name=""/>
+        <p:cNvGrpSpPr/>
+        <p:nvPr/>
+      </p:nvGrpSpPr>
+      <p:grpSpPr>
+        <a:xfrm>
+          <a:off x="0" y="0"/>
+          <a:ext cx="0" cy="0"/>
+          <a:chOff x="0" y="0"/>
+          <a:chExt cx="0" cy="0"/>
+        </a:xfrm>
+      </p:grpSpPr>
+      <p:pic>
+        <p:nvPicPr>
+          <p:cNvPr id="2" name="Picture 2"/>
+          <p:cNvPicPr>
+            <a:picLocks noChangeAspect="1"/>
+          </p:cNvPicPr>
+          <p:nvPr/>
+        </p:nvPicPr>
+        <p:blipFill>
+          <a:blip r:embed="rId2">
+            <a:extLst>
+              <a:ext uri="{28A0092B-C50C-407E-A947-70E740481C1C}">
+                <a14:useLocalDpi xmlns:a14="http://schemas.microsoft.com/office/drawing/2010/main" val="0"/>
+              </a:ext>
+              <a:ext uri="{96DAC541-7B7A-43D3-8B79-37D633B846F1}">
+                <asvg:svgBlip xmlns:asvg="http://schemas.microsoft.com/office/drawing/2016/SVG/main" r:embed="rId3"/>
+              </a:ext>
+            </a:extLst>
+          </a:blip>
+          <a:srcRect t="34026"/>
+          <a:stretch>
+            <a:fillRect/>
+          </a:stretch>
+        </p:blipFill>
+        <p:spPr>
+          <a:xfrm rot="-5400000" flipV="1">
+            <a:off x="13347499" y="1607857"/>
+            <a:ext cx="12384751" cy="7071286"/>
+          </a:xfrm>
+          <a:prstGeom prst="rect">
+            <a:avLst/>
+          </a:prstGeom>
+        </p:spPr>
+      </p:pic>
+      <p:sp>
+        <p:nvSpPr>
+          <p:cNvPr id="3" name="TextBox 3"/>
+          <p:cNvSpPr txBox="1"/>
+          <p:nvPr/>
+        </p:nvSpPr>
+        <p:spPr>
+          <a:xfrm>
+            <a:off x="1028700" y="1257300"/>
+            <a:ext cx="7841022" cy="923330"/>
+          </a:xfrm>
+          <a:prstGeom prst="rect">
+            <a:avLst/>
+          </a:prstGeom>
+        </p:spPr>
+        <p:txBody>
+          <a:bodyPr lIns="0" tIns="0" rIns="0" bIns="0" rtlCol="0" anchor="t">
+            <a:spAutoFit/>
+          </a:bodyPr>
+          <a:lstStyle/>
+          <a:p>
+            <a:r>
+              <a:rPr lang="en-US" sz="6000" dirty="0">
+                <a:solidFill>
+                  <a:srgbClr val="1836B2"/>
+                </a:solidFill>
+                <a:latin typeface="Fira Sans Medium Bold"/>
+              </a:rPr>
+              <a:t>DANH MỤC CHƯƠNG</a:t>
+            </a:r>
+          </a:p>
+        </p:txBody>
+      </p:sp>
+      <p:sp>
+        <p:nvSpPr>
+          <p:cNvPr id="4" name="TextBox 4"/>
+          <p:cNvSpPr txBox="1"/>
+          <p:nvPr/>
+        </p:nvSpPr>
+        <p:spPr>
+          <a:xfrm>
+            <a:off x="2438400" y="2705100"/>
+            <a:ext cx="11734800" cy="3693319"/>
+          </a:xfrm>
+          <a:prstGeom prst="rect">
+            <a:avLst/>
+          </a:prstGeom>
+        </p:spPr>
+        <p:txBody>
+          <a:bodyPr wrap="square" lIns="0" tIns="0" rIns="0" bIns="0" rtlCol="0" anchor="t">
+            <a:spAutoFit/>
+          </a:bodyPr>
+          <a:lstStyle/>
+          <a:p>
+            <a:pPr marL="0" lvl="0" indent="0" algn="l"/>
+            <a:r>
+              <a:rPr lang="en-US" sz="6000" u="none" dirty="0">
+                <a:solidFill>
+                  <a:srgbClr val="000000"/>
+                </a:solidFill>
+                <a:latin typeface="Fira Sans Light"/>
+              </a:rPr>
+              <a:t>GIỚI THIỆU ĐỀ TÀI</a:t>
+            </a:r>
+          </a:p>
+          <a:p>
+            <a:pPr marL="0" lvl="0" indent="0" algn="l"/>
+            <a:r>
+              <a:rPr lang="en-US" sz="6000" u="none" dirty="0">
+                <a:solidFill>
+                  <a:srgbClr val="000000"/>
+                </a:solidFill>
+                <a:latin typeface="Fira Sans Light"/>
+              </a:rPr>
+              <a:t>CƠ SỞ LÝ THUYẾT</a:t>
+            </a:r>
+            <a:endParaRPr lang="en-US" sz="6000" dirty="0">
+              <a:solidFill>
+                <a:srgbClr val="000000"/>
+              </a:solidFill>
+              <a:latin typeface="Fira Sans Light"/>
+            </a:endParaRPr>
+          </a:p>
+          <a:p>
+            <a:pPr marL="0" lvl="0" indent="0" algn="l"/>
+            <a:r>
+              <a:rPr lang="en-US" sz="6000" u="none" dirty="0">
+                <a:solidFill>
+                  <a:srgbClr val="000000"/>
+                </a:solidFill>
+                <a:latin typeface="Fira Sans Light"/>
+              </a:rPr>
+              <a:t>PHÂN TÍCH VÀ THIẾT KẾ HỆ THỐNG</a:t>
+            </a:r>
+          </a:p>
+          <a:p>
+            <a:pPr marL="0" lvl="0" indent="0" algn="l"/>
+            <a:r>
+              <a:rPr lang="en-US" sz="6000" u="none" dirty="0">
+                <a:solidFill>
+                  <a:srgbClr val="000000"/>
+                </a:solidFill>
+                <a:latin typeface="Fira Sans Light"/>
+              </a:rPr>
+              <a:t>XÂY DỰNG ỨNG DỤNG</a:t>
+            </a:r>
+          </a:p>
+        </p:txBody>
+      </p:sp>
+      <p:sp>
+        <p:nvSpPr>
+          <p:cNvPr id="5" name="TextBox 5"/>
+          <p:cNvSpPr txBox="1"/>
+          <p:nvPr/>
+        </p:nvSpPr>
+        <p:spPr>
+          <a:xfrm>
+            <a:off x="1028700" y="2705100"/>
+            <a:ext cx="981495" cy="4616648"/>
+          </a:xfrm>
+          <a:prstGeom prst="rect">
+            <a:avLst/>
+          </a:prstGeom>
+        </p:spPr>
+        <p:txBody>
+          <a:bodyPr lIns="0" tIns="0" rIns="0" bIns="0" rtlCol="0" anchor="t">
+            <a:spAutoFit/>
+          </a:bodyPr>
+          <a:lstStyle/>
+          <a:p>
+            <a:pPr marL="0" lvl="0" indent="0" algn="l">
+              <a:spcBef>
+                <a:spcPct val="0"/>
+              </a:spcBef>
+            </a:pPr>
+            <a:r>
+              <a:rPr lang="en-US" sz="6000" u="none" dirty="0">
+                <a:solidFill>
+                  <a:srgbClr val="000000"/>
+                </a:solidFill>
+                <a:latin typeface="Fira Sans Medium"/>
+              </a:rPr>
+              <a:t>01</a:t>
+            </a:r>
+          </a:p>
+          <a:p>
+            <a:pPr marL="0" lvl="0" indent="0" algn="l">
+              <a:spcBef>
+                <a:spcPct val="0"/>
+              </a:spcBef>
+            </a:pPr>
+            <a:r>
+              <a:rPr lang="en-US" sz="6000" u="none" dirty="0">
+                <a:solidFill>
+                  <a:srgbClr val="000000"/>
+                </a:solidFill>
+                <a:latin typeface="Fira Sans Medium"/>
+              </a:rPr>
+              <a:t>02</a:t>
+            </a:r>
+          </a:p>
+          <a:p>
+            <a:pPr marL="0" lvl="0" indent="0" algn="l">
+              <a:spcBef>
+                <a:spcPct val="0"/>
+              </a:spcBef>
+            </a:pPr>
+            <a:r>
+              <a:rPr lang="en-US" sz="6000" u="none" dirty="0">
+                <a:solidFill>
+                  <a:srgbClr val="000000"/>
+                </a:solidFill>
+                <a:latin typeface="Fira Sans Medium"/>
+              </a:rPr>
+              <a:t>03</a:t>
+            </a:r>
+          </a:p>
+          <a:p>
+            <a:pPr marL="0" lvl="0" indent="0" algn="l">
+              <a:spcBef>
+                <a:spcPct val="0"/>
+              </a:spcBef>
+            </a:pPr>
+            <a:r>
+              <a:rPr lang="en-US" sz="6000" u="none" dirty="0">
+                <a:solidFill>
+                  <a:srgbClr val="000000"/>
+                </a:solidFill>
+                <a:latin typeface="Fira Sans Medium"/>
+              </a:rPr>
+              <a:t>04</a:t>
+            </a:r>
+          </a:p>
+          <a:p>
+            <a:pPr marL="0" lvl="0" indent="0" algn="l">
+              <a:spcBef>
+                <a:spcPct val="0"/>
+              </a:spcBef>
+            </a:pPr>
+            <a:endParaRPr lang="en-US" sz="6000" u="none" dirty="0">
+              <a:solidFill>
+                <a:srgbClr val="000000"/>
+              </a:solidFill>
+              <a:latin typeface="Fira Sans Medium"/>
+            </a:endParaRPr>
           </a:p>
         </p:txBody>
       </p:sp>

</xml_diff>